<commit_message>
Changed picture from IRB120 to robot ISO rendering
</commit_message>
<xml_diff>
--- a/project update.pptx
+++ b/project update.pptx
@@ -11110,84 +11110,6 @@
           </a:p>
         </p:txBody>
       </p:sp>
-      <p:pic>
-        <p:nvPicPr>
-          <p:cNvPr id="1026" name="Picture 2"/>
-          <p:cNvPicPr>
-            <a:picLocks noChangeAspect="1" noChangeArrowheads="1"/>
-          </p:cNvPicPr>
-          <p:nvPr/>
-        </p:nvPicPr>
-        <p:blipFill rotWithShape="1">
-          <a:blip r:embed="rId3" cstate="screen">
-            <a:extLst>
-              <a:ext uri="{BEBA8EAE-BF5A-486C-A8C5-ECC9F3942E4B}">
-                <a14:imgProps xmlns:a14="http://schemas.microsoft.com/office/drawing/2010/main">
-                  <a14:imgLayer r:embed="rId4">
-                    <a14:imgEffect>
-                      <a14:backgroundRemoval t="3810" b="97143" l="4194" r="97248">
-                        <a14:foregroundMark x1="58453" y1="24762" x2="58453" y2="24762"/>
-                        <a14:foregroundMark x1="57143" y1="18095" x2="57143" y2="18095"/>
-                        <a14:foregroundMark x1="40760" y1="11714" x2="40760" y2="11714"/>
-                        <a14:foregroundMark x1="37484" y1="9048" x2="37484" y2="9048"/>
-                        <a14:foregroundMark x1="30799" y1="7619" x2="30799" y2="7619"/>
-                        <a14:backgroundMark x1="48755" y1="71619" x2="48755" y2="71619"/>
-                      </a14:backgroundRemoval>
-                    </a14:imgEffect>
-                  </a14:imgLayer>
-                </a14:imgProps>
-              </a:ext>
-              <a:ext uri="{28A0092B-C50C-407E-A947-70E740481C1C}">
-                <a14:useLocalDpi xmlns:a14="http://schemas.microsoft.com/office/drawing/2010/main"/>
-              </a:ext>
-            </a:extLst>
-          </a:blip>
-          <a:srcRect l="10331" r="6364" b="13078"/>
-          <a:stretch/>
-        </p:blipFill>
-        <p:spPr bwMode="auto">
-          <a:xfrm>
-            <a:off x="609600" y="1219200"/>
-            <a:ext cx="3876541" cy="5563673"/>
-          </a:xfrm>
-          <a:prstGeom prst="rect">
-            <a:avLst/>
-          </a:prstGeom>
-          <a:noFill/>
-          <a:ln>
-            <a:noFill/>
-          </a:ln>
-          <a:effectLst/>
-          <a:extLst>
-            <a:ext uri="{909E8E84-426E-40DD-AFC4-6F175D3DCCD1}">
-              <a14:hiddenFill xmlns:a14="http://schemas.microsoft.com/office/drawing/2010/main">
-                <a:solidFill>
-                  <a:schemeClr val="accent1"/>
-                </a:solidFill>
-              </a14:hiddenFill>
-            </a:ext>
-            <a:ext uri="{91240B29-F687-4F45-9708-019B960494DF}">
-              <a14:hiddenLine xmlns:a14="http://schemas.microsoft.com/office/drawing/2010/main" w="9525">
-                <a:solidFill>
-                  <a:schemeClr val="tx1"/>
-                </a:solidFill>
-                <a:miter lim="800000"/>
-                <a:headEnd/>
-                <a:tailEnd/>
-              </a14:hiddenLine>
-            </a:ext>
-            <a:ext uri="{AF507438-7753-43E0-B8FC-AC1667EBCBE1}">
-              <a14:hiddenEffects xmlns:a14="http://schemas.microsoft.com/office/drawing/2010/main">
-                <a:effectLst>
-                  <a:outerShdw dist="35921" dir="2700000" algn="ctr" rotWithShape="0">
-                    <a:schemeClr val="bg2"/>
-                  </a:outerShdw>
-                </a:effectLst>
-              </a14:hiddenEffects>
-            </a:ext>
-          </a:extLst>
-        </p:spPr>
-      </p:pic>
       <p:sp>
         <p:nvSpPr>
           <p:cNvPr id="8" name="Content Placeholder 7"/>
@@ -11237,6 +11159,47 @@
           </a:p>
         </p:txBody>
       </p:sp>
+      <p:pic>
+        <p:nvPicPr>
+          <p:cNvPr id="5" name="Picture 4"/>
+          <p:cNvPicPr>
+            <a:picLocks noChangeAspect="1"/>
+          </p:cNvPicPr>
+          <p:nvPr/>
+        </p:nvPicPr>
+        <p:blipFill rotWithShape="1">
+          <a:blip r:embed="rId3">
+            <a:extLst>
+              <a:ext uri="{BEBA8EAE-BF5A-486C-A8C5-ECC9F3942E4B}">
+                <a14:imgProps xmlns:a14="http://schemas.microsoft.com/office/drawing/2010/main">
+                  <a14:imgLayer r:embed="rId4">
+                    <a14:imgEffect>
+                      <a14:backgroundRemoval t="5521" b="92188" l="23516" r="81406">
+                        <a14:backgroundMark x1="39375" y1="58021" x2="39375" y2="58021"/>
+                        <a14:backgroundMark x1="48047" y1="70521" x2="48047" y2="70521"/>
+                      </a14:backgroundRemoval>
+                    </a14:imgEffect>
+                  </a14:imgLayer>
+                </a14:imgProps>
+              </a:ext>
+              <a:ext uri="{28A0092B-C50C-407E-A947-70E740481C1C}">
+                <a14:useLocalDpi xmlns:a14="http://schemas.microsoft.com/office/drawing/2010/main" val="0"/>
+              </a:ext>
+            </a:extLst>
+          </a:blip>
+          <a:srcRect l="23259" r="18290"/>
+          <a:stretch/>
+        </p:blipFill>
+        <p:spPr>
+          <a:xfrm>
+            <a:off x="228600" y="1295400"/>
+            <a:ext cx="3829319" cy="4913524"/>
+          </a:xfrm>
+          <a:prstGeom prst="rect">
+            <a:avLst/>
+          </a:prstGeom>
+        </p:spPr>
+      </p:pic>
     </p:spTree>
     <p:extLst>
       <p:ext uri="{BB962C8B-B14F-4D97-AF65-F5344CB8AC3E}">
@@ -11563,11 +11526,7 @@
           <a:p>
             <a:r>
               <a:rPr lang="en-US" dirty="0" smtClean="0"/>
-              <a:t>Started looking at a possible workflow for this type </a:t>
-            </a:r>
-            <a:r>
-              <a:rPr lang="en-US" smtClean="0"/>
-              <a:t>of robot</a:t>
+              <a:t>Started looking at a possible workflow for this type of robot</a:t>
             </a:r>
             <a:endParaRPr lang="en-US" dirty="0"/>
           </a:p>

</xml_diff>